<commit_message>
Updated to latest checks
</commit_message>
<xml_diff>
--- a/Mortality_Prediction_Analysis.pptx
+++ b/Mortality_Prediction_Analysis.pptx
@@ -139,7 +139,7 @@
 <file path=ppt/revisionInfo.xml><?xml version="1.0" encoding="utf-8"?>
 <p1510:revInfo xmlns:a="http://schemas.openxmlformats.org/drawingml/2006/main" xmlns:r="http://schemas.openxmlformats.org/officeDocument/2006/relationships" xmlns:p1510="http://schemas.microsoft.com/office/powerpoint/2015/10/main">
   <p1510:revLst>
-    <p1510:client id="{D79C2CB3-F1EC-48B8-A9E9-F2F6035E9061}" v="728" dt="2023-01-15T10:09:20.971"/>
+    <p1510:client id="{D79C2CB3-F1EC-48B8-A9E9-F2F6035E9061}" v="729" dt="2023-01-18T09:37:10.666"/>
   </p1510:revLst>
 </p1510:revInfo>
 </file>
@@ -9879,7 +9879,7 @@
           <a:p>
             <a:fld id="{8F87AAED-21A2-3648-B675-D9D2F8B54CB9}" type="datetimeFigureOut">
               <a:rPr lang="en-US" smtClean="0"/>
-              <a:t>1/15/2023</a:t>
+              <a:t>1/18/2023</a:t>
             </a:fld>
             <a:endParaRPr lang="en-US"/>
           </a:p>
@@ -10045,7 +10045,7 @@
             <a:fld id="{DA51C821-7690-4521-8EE2-4B7BF9015EAE}" type="datetimeFigureOut">
               <a:rPr lang="en-US" smtClean="0"/>
               <a:pPr/>
-              <a:t>1/15/2023</a:t>
+              <a:t>1/18/2023</a:t>
             </a:fld>
             <a:endParaRPr lang="en-US" dirty="0"/>
           </a:p>
@@ -11777,7 +11777,7 @@
             <a:fld id="{3FB73CCA-537D-4D2D-8784-752FB3BB3E4C}" type="datetimeFigureOut">
               <a:rPr lang="en-US" smtClean="0"/>
               <a:pPr/>
-              <a:t>1/15/2023</a:t>
+              <a:t>1/18/2023</a:t>
             </a:fld>
             <a:endParaRPr lang="en-US" dirty="0"/>
           </a:p>
@@ -11912,7 +11912,7 @@
           <a:noFill/>
           <a:extLst>
             <a:ext uri="{909E8E84-426E-40dd-AFC4-6F175D3DCCD1}">
-              <a14:hiddenFill xmlns:a14="http://schemas.microsoft.com/office/drawing/2010/main" xmlns="">
+              <a14:hiddenFill xmlns="" xmlns:a14="http://schemas.microsoft.com/office/drawing/2010/main">
                 <a:solidFill>
                   <a:srgbClr val="FFFFFF"/>
                 </a:solidFill>
@@ -12816,7 +12816,7 @@
           <a:p>
             <a:fld id="{3FB73CCA-537D-4D2D-8784-752FB3BB3E4C}" type="datetimeFigureOut">
               <a:rPr lang="en-US" smtClean="0"/>
-              <a:t>1/15/2023</a:t>
+              <a:t>1/18/2023</a:t>
             </a:fld>
             <a:endParaRPr lang="en-US"/>
           </a:p>
@@ -14192,11 +14192,11 @@
   <p:clrMapOvr>
     <a:masterClrMapping/>
   </p:clrMapOvr>
-  <mc:AlternateContent xmlns:mc="http://schemas.openxmlformats.org/markup-compatibility/2006">
-    <mc:Choice xmlns:p14="http://schemas.microsoft.com/office/powerpoint/2010/main" Requires="p14">
+  <mc:AlternateContent xmlns:mc="http://schemas.openxmlformats.org/markup-compatibility/2006" xmlns:p14="http://schemas.microsoft.com/office/powerpoint/2010/main">
+    <mc:Choice Requires="p14">
       <p:transition spd="slow" p14:dur="2000" advTm="6000"/>
     </mc:Choice>
-    <mc:Fallback>
+    <mc:Fallback xmlns="">
       <p:transition spd="slow" advTm="6000"/>
     </mc:Fallback>
   </mc:AlternateContent>
@@ -14309,7 +14309,7 @@
           <p:nvPr>
             <p:extLst>
               <p:ext uri="{D42A27DB-BD31-4B8C-83A1-F6EECF244321}">
-                <p14:modId xmlns:p14="http://schemas.microsoft.com/office/powerpoint/2010/main" val="2721294723"/>
+                <p14:modId xmlns:p14="http://schemas.microsoft.com/office/powerpoint/2010/main" val="2398953667"/>
               </p:ext>
             </p:extLst>
           </p:nvPr>
@@ -14373,11 +14373,11 @@
   <p:clrMapOvr>
     <a:masterClrMapping/>
   </p:clrMapOvr>
-  <mc:AlternateContent xmlns:mc="http://schemas.openxmlformats.org/markup-compatibility/2006">
-    <mc:Choice xmlns:p14="http://schemas.microsoft.com/office/powerpoint/2010/main" Requires="p14">
+  <mc:AlternateContent xmlns:mc="http://schemas.openxmlformats.org/markup-compatibility/2006" xmlns:p14="http://schemas.microsoft.com/office/powerpoint/2010/main">
+    <mc:Choice Requires="p14">
       <p:transition spd="slow" p14:dur="2000" advTm="6000"/>
     </mc:Choice>
-    <mc:Fallback>
+    <mc:Fallback xmlns="">
       <p:transition spd="slow" advTm="6000"/>
     </mc:Fallback>
   </mc:AlternateContent>
@@ -14759,11 +14759,11 @@
   <p:clrMapOvr>
     <a:masterClrMapping/>
   </p:clrMapOvr>
-  <mc:AlternateContent xmlns:mc="http://schemas.openxmlformats.org/markup-compatibility/2006">
-    <mc:Choice xmlns:p14="http://schemas.microsoft.com/office/powerpoint/2010/main" Requires="p14">
+  <mc:AlternateContent xmlns:mc="http://schemas.openxmlformats.org/markup-compatibility/2006" xmlns:p14="http://schemas.microsoft.com/office/powerpoint/2010/main">
+    <mc:Choice Requires="p14">
       <p:transition spd="slow" p14:dur="2000" advTm="6000"/>
     </mc:Choice>
-    <mc:Fallback>
+    <mc:Fallback xmlns="">
       <p:transition spd="slow" advTm="6000"/>
     </mc:Fallback>
   </mc:AlternateContent>
@@ -15092,11 +15092,11 @@
   <p:clrMapOvr>
     <a:masterClrMapping/>
   </p:clrMapOvr>
-  <mc:AlternateContent xmlns:mc="http://schemas.openxmlformats.org/markup-compatibility/2006">
-    <mc:Choice xmlns:p14="http://schemas.microsoft.com/office/powerpoint/2010/main" Requires="p14">
+  <mc:AlternateContent xmlns:mc="http://schemas.openxmlformats.org/markup-compatibility/2006" xmlns:p14="http://schemas.microsoft.com/office/powerpoint/2010/main">
+    <mc:Choice Requires="p14">
       <p:transition spd="slow" p14:dur="2000" advTm="6000"/>
     </mc:Choice>
-    <mc:Fallback>
+    <mc:Fallback xmlns="">
       <p:transition spd="slow" advTm="6000"/>
     </mc:Fallback>
   </mc:AlternateContent>

</xml_diff>